<commit_message>
template to report generator
</commit_message>
<xml_diff>
--- a/chart-01.pptx
+++ b/chart-01.pptx
@@ -6,6 +6,9 @@
   </p:sldMasterIdLst>
   <p:sldIdLst>
     <p:sldId r:id="rId7" id="256"/>
+    <p:sldId r:id="rId8" id="257"/>
+    <p:sldId r:id="rId9" id="258"/>
+    <p:sldId r:id="rId10" id="259"/>
   </p:sldIdLst>
   <p:sldSz cx="9144000" cy="6858000" type="screen4x3"/>
   <p:notesSz cx="6858000" cy="9144000"/>
@@ -149,10 +152,10 @@
                 <c:formatCode>General</c:formatCode>
                 <c:ptCount val="2"/>
                 <c:pt idx="0">
-                  <c:v>62.5</c:v>
+                  <c:v>31.25</c:v>
                 </c:pt>
                 <c:pt idx="1">
-                  <c:v>37.5</c:v>
+                  <c:v>18.75</c:v>
                 </c:pt>
               </c:numCache>
             </c:numRef>
@@ -188,6 +191,427 @@
         <c:crosses val="autoZero"/>
       </c:valAx>
     </c:plotArea>
+  </c:chart>
+  <c:txPr>
+    <a:bodyPr/>
+    <a:lstStyle/>
+    <a:p>
+      <a:pPr>
+        <a:defRPr sz="1800"/>
+      </a:pPr>
+      <a:endParaRPr lang="en-US"/>
+    </a:p>
+  </c:txPr>
+  <c:externalData r:id="rId1">
+    <c:autoUpdate val="0"/>
+  </c:externalData>
+</c:chartSpace>
+</file>
+
+<file path=ppt/charts/chart2.xml><?xml version="1.0" encoding="utf-8"?>
+<c:chartSpace xmlns:c="http://schemas.openxmlformats.org/drawingml/2006/chart" xmlns:a="http://schemas.openxmlformats.org/drawingml/2006/main" xmlns:r="http://schemas.openxmlformats.org/officeDocument/2006/relationships">
+  <c:chart>
+    <c:plotArea>
+      <c:pieChart>
+        <c:varyColors val="1"/>
+        <c:ser>
+          <c:idx val="0"/>
+          <c:order val="0"/>
+          <c:tx>
+            <c:strRef>
+              <c:f>Sheet1!$B$1</c:f>
+              <c:strCache>
+                <c:ptCount val="1"/>
+                <c:pt idx="0">
+                  <c:v>Daily Intake of Fruits</c:v>
+                </c:pt>
+              </c:strCache>
+            </c:strRef>
+          </c:tx>
+          <c:cat>
+            <c:strRef>
+              <c:f>Sheet1!$A$2:$A$3</c:f>
+              <c:strCache>
+                <c:ptCount val="2"/>
+                <c:pt idx="0">
+                  <c:v>Goal</c:v>
+                </c:pt>
+                <c:pt idx="1">
+                  <c:v>Less Than Goal</c:v>
+                </c:pt>
+              </c:strCache>
+            </c:strRef>
+          </c:cat>
+          <c:val>
+            <c:numRef>
+              <c:f>Sheet1!$B$2:$B$3</c:f>
+              <c:numCache>
+                <c:formatCode>General</c:formatCode>
+                <c:ptCount val="2"/>
+                <c:pt idx="0">
+                  <c:v>0.69</c:v>
+                </c:pt>
+                <c:pt idx="1">
+                  <c:v>0.31</c:v>
+                </c:pt>
+              </c:numCache>
+            </c:numRef>
+          </c:val>
+        </c:ser>
+        <c:dLbls>
+          <c:numFmt formatCode="0%" sourceLinked="0"/>
+          <c:dLblPos val="outEnd"/>
+          <c:showLegendKey val="0"/>
+          <c:showVal val="1"/>
+          <c:showCatName val="0"/>
+          <c:showSerName val="0"/>
+          <c:showPercent val="0"/>
+          <c:showBubbleSize val="0"/>
+        </c:dLbls>
+      </c:pieChart>
+    </c:plotArea>
+    <c:legend>
+      <c:legendPos val="b"/>
+      <c:overlay val="0"/>
+    </c:legend>
+  </c:chart>
+  <c:txPr>
+    <a:bodyPr/>
+    <a:lstStyle/>
+    <a:p>
+      <a:pPr>
+        <a:defRPr sz="1800"/>
+      </a:pPr>
+      <a:endParaRPr lang="en-US"/>
+    </a:p>
+  </c:txPr>
+  <c:externalData r:id="rId1">
+    <c:autoUpdate val="0"/>
+  </c:externalData>
+</c:chartSpace>
+</file>
+
+<file path=ppt/charts/chart3.xml><?xml version="1.0" encoding="utf-8"?>
+<c:chartSpace xmlns:c="http://schemas.openxmlformats.org/drawingml/2006/chart" xmlns:a="http://schemas.openxmlformats.org/drawingml/2006/main" xmlns:r="http://schemas.openxmlformats.org/officeDocument/2006/relationships">
+  <c:chart>
+    <c:plotArea>
+      <c:pieChart>
+        <c:varyColors val="1"/>
+        <c:ser>
+          <c:idx val="0"/>
+          <c:order val="0"/>
+          <c:tx>
+            <c:strRef>
+              <c:f>Sheet1!$B$1</c:f>
+              <c:strCache>
+                <c:ptCount val="1"/>
+                <c:pt idx="0">
+                  <c:v>Daily Intake of Whole Grain</c:v>
+                </c:pt>
+              </c:strCache>
+            </c:strRef>
+          </c:tx>
+          <c:cat>
+            <c:strRef>
+              <c:f>Sheet1!$A$2:$A$3</c:f>
+              <c:strCache>
+                <c:ptCount val="2"/>
+                <c:pt idx="0">
+                  <c:v>Goal</c:v>
+                </c:pt>
+                <c:pt idx="1">
+                  <c:v>Less Than Goal</c:v>
+                </c:pt>
+              </c:strCache>
+            </c:strRef>
+          </c:cat>
+          <c:val>
+            <c:numRef>
+              <c:f>Sheet1!$B$2:$B$3</c:f>
+              <c:numCache>
+                <c:formatCode>General</c:formatCode>
+                <c:ptCount val="2"/>
+                <c:pt idx="0">
+                  <c:v>0.51</c:v>
+                </c:pt>
+                <c:pt idx="1">
+                  <c:v>0.49</c:v>
+                </c:pt>
+              </c:numCache>
+            </c:numRef>
+          </c:val>
+        </c:ser>
+        <c:dLbls>
+          <c:numFmt formatCode="0%" sourceLinked="0"/>
+          <c:dLblPos val="outEnd"/>
+          <c:showLegendKey val="0"/>
+          <c:showVal val="1"/>
+          <c:showCatName val="0"/>
+          <c:showSerName val="0"/>
+          <c:showPercent val="0"/>
+          <c:showBubbleSize val="0"/>
+        </c:dLbls>
+      </c:pieChart>
+    </c:plotArea>
+    <c:legend>
+      <c:legendPos val="b"/>
+      <c:overlay val="0"/>
+    </c:legend>
+  </c:chart>
+  <c:txPr>
+    <a:bodyPr/>
+    <a:lstStyle/>
+    <a:p>
+      <a:pPr>
+        <a:defRPr sz="1800"/>
+      </a:pPr>
+      <a:endParaRPr lang="en-US"/>
+    </a:p>
+  </c:txPr>
+  <c:externalData r:id="rId1">
+    <c:autoUpdate val="0"/>
+  </c:externalData>
+</c:chartSpace>
+</file>
+
+<file path=ppt/charts/chart4.xml><?xml version="1.0" encoding="utf-8"?>
+<c:chartSpace xmlns:c="http://schemas.openxmlformats.org/drawingml/2006/chart" xmlns:a="http://schemas.openxmlformats.org/drawingml/2006/main" xmlns:r="http://schemas.openxmlformats.org/officeDocument/2006/relationships">
+  <c:chart>
+    <c:plotArea>
+      <c:pieChart>
+        <c:varyColors val="1"/>
+        <c:ser>
+          <c:idx val="0"/>
+          <c:order val="0"/>
+          <c:tx>
+            <c:strRef>
+              <c:f>Sheet1!$B$1</c:f>
+              <c:strCache>
+                <c:ptCount val="1"/>
+                <c:pt idx="0">
+                  <c:v>Daily Intake of Vegetables</c:v>
+                </c:pt>
+              </c:strCache>
+            </c:strRef>
+          </c:tx>
+          <c:cat>
+            <c:strRef>
+              <c:f>Sheet1!$A$2:$A$3</c:f>
+              <c:strCache>
+                <c:ptCount val="2"/>
+                <c:pt idx="0">
+                  <c:v>Goal</c:v>
+                </c:pt>
+                <c:pt idx="1">
+                  <c:v>Less Than Goal</c:v>
+                </c:pt>
+              </c:strCache>
+            </c:strRef>
+          </c:cat>
+          <c:val>
+            <c:numRef>
+              <c:f>Sheet1!$B$2:$B$3</c:f>
+              <c:numCache>
+                <c:formatCode>General</c:formatCode>
+                <c:ptCount val="2"/>
+                <c:pt idx="0">
+                  <c:v>0.63</c:v>
+                </c:pt>
+                <c:pt idx="1">
+                  <c:v>0.37</c:v>
+                </c:pt>
+              </c:numCache>
+            </c:numRef>
+          </c:val>
+        </c:ser>
+        <c:dLbls>
+          <c:numFmt formatCode="0%" sourceLinked="0"/>
+          <c:dLblPos val="outEnd"/>
+          <c:showLegendKey val="0"/>
+          <c:showVal val="1"/>
+          <c:showCatName val="0"/>
+          <c:showSerName val="0"/>
+          <c:showPercent val="0"/>
+          <c:showBubbleSize val="0"/>
+        </c:dLbls>
+      </c:pieChart>
+    </c:plotArea>
+    <c:legend>
+      <c:legendPos val="b"/>
+      <c:overlay val="0"/>
+    </c:legend>
+  </c:chart>
+  <c:txPr>
+    <a:bodyPr/>
+    <a:lstStyle/>
+    <a:p>
+      <a:pPr>
+        <a:defRPr sz="1800"/>
+      </a:pPr>
+      <a:endParaRPr lang="en-US"/>
+    </a:p>
+  </c:txPr>
+  <c:externalData r:id="rId1">
+    <c:autoUpdate val="0"/>
+  </c:externalData>
+</c:chartSpace>
+</file>
+
+<file path=ppt/charts/chart5.xml><?xml version="1.0" encoding="utf-8"?>
+<c:chartSpace xmlns:c="http://schemas.openxmlformats.org/drawingml/2006/chart" xmlns:a="http://schemas.openxmlformats.org/drawingml/2006/main" xmlns:r="http://schemas.openxmlformats.org/officeDocument/2006/relationships">
+  <c:chart>
+    <c:plotArea>
+      <c:pieChart>
+        <c:varyColors val="1"/>
+        <c:ser>
+          <c:idx val="0"/>
+          <c:order val="0"/>
+          <c:tx>
+            <c:strRef>
+              <c:f>Sheet1!$B$1</c:f>
+              <c:strCache>
+                <c:ptCount val="1"/>
+                <c:pt idx="0">
+                  <c:v>Daily Intake of Calcium</c:v>
+                </c:pt>
+              </c:strCache>
+            </c:strRef>
+          </c:tx>
+          <c:cat>
+            <c:strRef>
+              <c:f>Sheet1!$A$2:$A$3</c:f>
+              <c:strCache>
+                <c:ptCount val="2"/>
+                <c:pt idx="0">
+                  <c:v>Goal</c:v>
+                </c:pt>
+                <c:pt idx="1">
+                  <c:v>Less Than Goal</c:v>
+                </c:pt>
+              </c:strCache>
+            </c:strRef>
+          </c:cat>
+          <c:val>
+            <c:numRef>
+              <c:f>Sheet1!$B$2:$B$3</c:f>
+              <c:numCache>
+                <c:formatCode>General</c:formatCode>
+                <c:ptCount val="2"/>
+                <c:pt idx="0">
+                  <c:v>0.43</c:v>
+                </c:pt>
+                <c:pt idx="1">
+                  <c:v>0.57</c:v>
+                </c:pt>
+              </c:numCache>
+            </c:numRef>
+          </c:val>
+        </c:ser>
+        <c:dLbls>
+          <c:numFmt formatCode="0%" sourceLinked="0"/>
+          <c:dLblPos val="outEnd"/>
+          <c:showLegendKey val="0"/>
+          <c:showVal val="1"/>
+          <c:showCatName val="0"/>
+          <c:showSerName val="0"/>
+          <c:showPercent val="0"/>
+          <c:showBubbleSize val="0"/>
+        </c:dLbls>
+      </c:pieChart>
+    </c:plotArea>
+    <c:legend>
+      <c:legendPos val="b"/>
+      <c:overlay val="0"/>
+    </c:legend>
+  </c:chart>
+  <c:txPr>
+    <a:bodyPr/>
+    <a:lstStyle/>
+    <a:p>
+      <a:pPr>
+        <a:defRPr sz="1800"/>
+      </a:pPr>
+      <a:endParaRPr lang="en-US"/>
+    </a:p>
+  </c:txPr>
+  <c:externalData r:id="rId1">
+    <c:autoUpdate val="0"/>
+  </c:externalData>
+</c:chartSpace>
+</file>
+
+<file path=ppt/charts/chart6.xml><?xml version="1.0" encoding="utf-8"?>
+<c:chartSpace xmlns:c="http://schemas.openxmlformats.org/drawingml/2006/chart" xmlns:a="http://schemas.openxmlformats.org/drawingml/2006/main" xmlns:r="http://schemas.openxmlformats.org/officeDocument/2006/relationships">
+  <c:chart>
+    <c:plotArea>
+      <c:pieChart>
+        <c:varyColors val="1"/>
+        <c:ser>
+          <c:idx val="0"/>
+          <c:order val="0"/>
+          <c:tx>
+            <c:strRef>
+              <c:f>Sheet1!$B$1</c:f>
+              <c:strCache>
+                <c:ptCount val="1"/>
+                <c:pt idx="0">
+                  <c:v>Daily Intake of Protein</c:v>
+                </c:pt>
+              </c:strCache>
+            </c:strRef>
+          </c:tx>
+          <c:cat>
+            <c:strRef>
+              <c:f>Sheet1!$A$2:$A$4</c:f>
+              <c:strCache>
+                <c:ptCount val="3"/>
+                <c:pt idx="0">
+                  <c:v>At Recommended Amount</c:v>
+                </c:pt>
+                <c:pt idx="1">
+                  <c:v>Less Than Recommended Amount</c:v>
+                </c:pt>
+                <c:pt idx="2">
+                  <c:v>Greater Than Recommended Amount</c:v>
+                </c:pt>
+              </c:strCache>
+            </c:strRef>
+          </c:cat>
+          <c:val>
+            <c:numRef>
+              <c:f>Sheet1!$B$2:$B$4</c:f>
+              <c:numCache>
+                <c:formatCode>General</c:formatCode>
+                <c:ptCount val="3"/>
+                <c:pt idx="0">
+                  <c:v>0.78</c:v>
+                </c:pt>
+                <c:pt idx="1">
+                  <c:v>0.18</c:v>
+                </c:pt>
+                <c:pt idx="2">
+                  <c:v>0.04</c:v>
+                </c:pt>
+              </c:numCache>
+            </c:numRef>
+          </c:val>
+        </c:ser>
+        <c:dLbls>
+          <c:numFmt formatCode="0%" sourceLinked="0"/>
+          <c:dLblPos val="outEnd"/>
+          <c:showLegendKey val="0"/>
+          <c:showVal val="1"/>
+          <c:showCatName val="0"/>
+          <c:showSerName val="0"/>
+          <c:showPercent val="0"/>
+          <c:showBubbleSize val="0"/>
+        </c:dLbls>
+      </c:pieChart>
+    </c:plotArea>
+    <c:legend>
+      <c:legendPos val="b"/>
+      <c:overlay val="0"/>
+    </c:legend>
   </c:chart>
   <c:txPr>
     <a:bodyPr/>
@@ -3214,6 +3638,304 @@
         <p:xfrm>
           <a:off x="1828800" y="1828800"/>
           <a:ext cx="5486400" cy="4114800"/>
+        </p:xfrm>
+        <a:graphic>
+          <a:graphicData uri="http://schemas.openxmlformats.org/drawingml/2006/chart">
+            <c:chart xmlns:c="http://schemas.openxmlformats.org/drawingml/2006/chart" r:id="rId2"/>
+          </a:graphicData>
+        </a:graphic>
+      </p:graphicFrame>
+    </p:spTree>
+  </p:cSld>
+  <p:clrMapOvr>
+    <a:masterClrMapping/>
+  </p:clrMapOvr>
+</p:sld>
+</file>
+
+<file path=ppt/slides/slide2.xml><?xml version="1.0" encoding="utf-8"?>
+<p:sld xmlns:a="http://schemas.openxmlformats.org/drawingml/2006/main" xmlns:p="http://schemas.openxmlformats.org/presentationml/2006/main" xmlns:r="http://schemas.openxmlformats.org/officeDocument/2006/relationships">
+  <p:cSld>
+    <p:spTree>
+      <p:nvGrpSpPr>
+        <p:cNvPr id="1" name=""/>
+        <p:cNvGrpSpPr/>
+        <p:nvPr/>
+      </p:nvGrpSpPr>
+      <p:grpSpPr/>
+      <p:sp>
+        <p:nvSpPr>
+          <p:cNvPr id="2" name="Title 1"/>
+          <p:cNvSpPr>
+            <a:spLocks noGrp="1"/>
+          </p:cNvSpPr>
+          <p:nvPr>
+            <p:ph type="title"/>
+          </p:nvPr>
+        </p:nvSpPr>
+        <p:spPr/>
+        <p:txBody>
+          <a:bodyPr/>
+          <a:lstStyle/>
+          <a:p>
+            <a:r>
+              <a:t>Who Participated?</a:t>
+            </a:r>
+          </a:p>
+        </p:txBody>
+      </p:sp>
+      <p:sp>
+        <p:nvSpPr>
+          <p:cNvPr id="3" name="Content Placeholder 2"/>
+          <p:cNvSpPr>
+            <a:spLocks noGrp="1"/>
+          </p:cNvSpPr>
+          <p:nvPr>
+            <p:ph idx="1"/>
+          </p:nvPr>
+        </p:nvSpPr>
+        <p:spPr/>
+        <p:txBody>
+          <a:bodyPr/>
+          <a:lstStyle/>
+          <a:p/>
+          <a:p>
+            <a:pPr>
+              <a:defRPr sz="4000"/>
+            </a:pPr>
+            <a:r>
+              <a:t>48 Individuals completed fasting biometric screening</a:t>
+            </a:r>
+          </a:p>
+          <a:p>
+            <a:pPr>
+              <a:defRPr sz="4000"/>
+            </a:pPr>
+            <a:r>
+              <a:t>Female Participants: 67%</a:t>
+            </a:r>
+          </a:p>
+          <a:p>
+            <a:pPr>
+              <a:defRPr sz="4000"/>
+            </a:pPr>
+            <a:r>
+              <a:t>Male Participants: 33%</a:t>
+            </a:r>
+          </a:p>
+          <a:p>
+            <a:pPr>
+              <a:defRPr sz="4000"/>
+            </a:pPr>
+            <a:r>
+              <a:t>Average Age: 47 years</a:t>
+            </a:r>
+          </a:p>
+        </p:txBody>
+      </p:sp>
+    </p:spTree>
+  </p:cSld>
+  <p:clrMapOvr>
+    <a:masterClrMapping/>
+  </p:clrMapOvr>
+</p:sld>
+</file>
+
+<file path=ppt/slides/slide3.xml><?xml version="1.0" encoding="utf-8"?>
+<p:sld xmlns:a="http://schemas.openxmlformats.org/drawingml/2006/main" xmlns:p="http://schemas.openxmlformats.org/presentationml/2006/main" xmlns:r="http://schemas.openxmlformats.org/officeDocument/2006/relationships">
+  <p:cSld>
+    <p:spTree>
+      <p:nvGrpSpPr>
+        <p:cNvPr id="1" name=""/>
+        <p:cNvGrpSpPr/>
+        <p:nvPr/>
+      </p:nvGrpSpPr>
+      <p:grpSpPr/>
+      <p:sp>
+        <p:nvSpPr>
+          <p:cNvPr id="2" name="Title 1"/>
+          <p:cNvSpPr>
+            <a:spLocks noGrp="1"/>
+          </p:cNvSpPr>
+          <p:nvPr>
+            <p:ph type="title"/>
+          </p:nvPr>
+        </p:nvSpPr>
+        <p:spPr/>
+        <p:txBody>
+          <a:bodyPr/>
+          <a:lstStyle/>
+          <a:p>
+            <a:r>
+              <a:t>Meeting Daily Nutrition Requirements</a:t>
+            </a:r>
+          </a:p>
+        </p:txBody>
+      </p:sp>
+      <p:graphicFrame>
+        <p:nvGraphicFramePr>
+          <p:cNvPr id="3" name="Chart 2"/>
+          <p:cNvGraphicFramePr>
+            <a:graphicFrameLocks noGrp="1"/>
+          </p:cNvGraphicFramePr>
+          <p:nvPr/>
+        </p:nvGraphicFramePr>
+        <p:xfrm>
+          <a:off x="914400" y="1828800"/>
+          <a:ext cx="2743200" cy="2743200"/>
+        </p:xfrm>
+        <a:graphic>
+          <a:graphicData uri="http://schemas.openxmlformats.org/drawingml/2006/chart">
+            <c:chart xmlns:c="http://schemas.openxmlformats.org/drawingml/2006/chart" r:id="rId2"/>
+          </a:graphicData>
+        </a:graphic>
+      </p:graphicFrame>
+      <p:graphicFrame>
+        <p:nvGraphicFramePr>
+          <p:cNvPr id="4" name="Chart 3"/>
+          <p:cNvGraphicFramePr>
+            <a:graphicFrameLocks noGrp="1"/>
+          </p:cNvGraphicFramePr>
+          <p:nvPr/>
+        </p:nvGraphicFramePr>
+        <p:xfrm>
+          <a:off x="4572000" y="1828800"/>
+          <a:ext cx="3657600" cy="2743200"/>
+        </p:xfrm>
+        <a:graphic>
+          <a:graphicData uri="http://schemas.openxmlformats.org/drawingml/2006/chart">
+            <c:chart xmlns:c="http://schemas.openxmlformats.org/drawingml/2006/chart" r:id="rId3"/>
+          </a:graphicData>
+        </a:graphic>
+      </p:graphicFrame>
+      <p:graphicFrame>
+        <p:nvGraphicFramePr>
+          <p:cNvPr id="5" name="Chart 4"/>
+          <p:cNvGraphicFramePr>
+            <a:graphicFrameLocks noGrp="1"/>
+          </p:cNvGraphicFramePr>
+          <p:nvPr/>
+        </p:nvGraphicFramePr>
+        <p:xfrm>
+          <a:off x="457200" y="4572000"/>
+          <a:ext cx="3657600" cy="2743200"/>
+        </p:xfrm>
+        <a:graphic>
+          <a:graphicData uri="http://schemas.openxmlformats.org/drawingml/2006/chart">
+            <c:chart xmlns:c="http://schemas.openxmlformats.org/drawingml/2006/chart" r:id="rId4"/>
+          </a:graphicData>
+        </a:graphic>
+      </p:graphicFrame>
+      <p:graphicFrame>
+        <p:nvGraphicFramePr>
+          <p:cNvPr id="6" name="Chart 5"/>
+          <p:cNvGraphicFramePr>
+            <a:graphicFrameLocks noGrp="1"/>
+          </p:cNvGraphicFramePr>
+          <p:nvPr/>
+        </p:nvGraphicFramePr>
+        <p:xfrm>
+          <a:off x="4572000" y="4572000"/>
+          <a:ext cx="3657600" cy="2743200"/>
+        </p:xfrm>
+        <a:graphic>
+          <a:graphicData uri="http://schemas.openxmlformats.org/drawingml/2006/chart">
+            <c:chart xmlns:c="http://schemas.openxmlformats.org/drawingml/2006/chart" r:id="rId5"/>
+          </a:graphicData>
+        </a:graphic>
+      </p:graphicFrame>
+    </p:spTree>
+  </p:cSld>
+  <p:clrMapOvr>
+    <a:masterClrMapping/>
+  </p:clrMapOvr>
+</p:sld>
+</file>
+
+<file path=ppt/slides/slide4.xml><?xml version="1.0" encoding="utf-8"?>
+<p:sld xmlns:a="http://schemas.openxmlformats.org/drawingml/2006/main" xmlns:p="http://schemas.openxmlformats.org/presentationml/2006/main" xmlns:r="http://schemas.openxmlformats.org/officeDocument/2006/relationships">
+  <p:cSld>
+    <p:spTree>
+      <p:nvGrpSpPr>
+        <p:cNvPr id="1" name=""/>
+        <p:cNvGrpSpPr/>
+        <p:nvPr/>
+      </p:nvGrpSpPr>
+      <p:grpSpPr/>
+      <p:sp>
+        <p:nvSpPr>
+          <p:cNvPr id="2" name="Title 1"/>
+          <p:cNvSpPr>
+            <a:spLocks noGrp="1"/>
+          </p:cNvSpPr>
+          <p:nvPr>
+            <p:ph type="title"/>
+          </p:nvPr>
+        </p:nvSpPr>
+        <p:spPr/>
+        <p:txBody>
+          <a:bodyPr/>
+          <a:lstStyle/>
+          <a:p>
+            <a:r>
+              <a:t>Meeting Daily Nutrition Requirements</a:t>
+            </a:r>
+          </a:p>
+        </p:txBody>
+      </p:sp>
+      <p:sp>
+        <p:nvSpPr>
+          <p:cNvPr id="3" name="Content Placeholder 2"/>
+          <p:cNvSpPr>
+            <a:spLocks noGrp="1"/>
+          </p:cNvSpPr>
+          <p:nvPr>
+            <p:ph idx="1" sz="half"/>
+          </p:nvPr>
+        </p:nvSpPr>
+        <p:spPr/>
+        <p:txBody>
+          <a:bodyPr/>
+          <a:lstStyle/>
+          <a:p/>
+        </p:txBody>
+      </p:sp>
+      <p:sp>
+        <p:nvSpPr>
+          <p:cNvPr id="4" name="Content Placeholder 3"/>
+          <p:cNvSpPr>
+            <a:spLocks noGrp="1"/>
+          </p:cNvSpPr>
+          <p:nvPr>
+            <p:ph idx="2" sz="half"/>
+          </p:nvPr>
+        </p:nvSpPr>
+        <p:spPr/>
+        <p:txBody>
+          <a:bodyPr/>
+          <a:lstStyle/>
+          <a:p/>
+          <a:p>
+            <a:pPr>
+              <a:defRPr sz="2000"/>
+            </a:pPr>
+            <a:r>
+              <a:t>Inadequate intake of nutrient-dense foods can lead to nutrient deficiencies, impairs worker productivity, and contributes to disease risk.  Even small positive dietary changes can have a profound effect on overall health and wellbeing.</a:t>
+            </a:r>
+          </a:p>
+        </p:txBody>
+      </p:sp>
+      <p:graphicFrame>
+        <p:nvGraphicFramePr>
+          <p:cNvPr id="5" name="Chart 4"/>
+          <p:cNvGraphicFramePr>
+            <a:graphicFrameLocks noGrp="1"/>
+          </p:cNvGraphicFramePr>
+          <p:nvPr/>
+        </p:nvGraphicFramePr>
+        <p:xfrm>
+          <a:off x="914400" y="914400"/>
+          <a:ext cx="4572000" cy="3657600"/>
         </p:xfrm>
         <a:graphic>
           <a:graphicData uri="http://schemas.openxmlformats.org/drawingml/2006/chart">

</xml_diff>